<commit_message>
H8 added not done
</commit_message>
<xml_diff>
--- a/ppts/5 - Model quality.pptx
+++ b/ppts/5 - Model quality.pptx
@@ -4185,7 +4185,7 @@
           <a:p>
             <a:fld id="{15E4F5CE-CB34-4A0C-9595-867A2C0DB20E}" type="datetimeFigureOut">
               <a:rPr lang="nl-BE" smtClean="0"/>
-              <a:t>8/05/2025</a:t>
+              <a:t>15/05/2025</a:t>
             </a:fld>
             <a:endParaRPr lang="nl-BE"/>
           </a:p>
@@ -4362,7 +4362,7 @@
           <a:p>
             <a:fld id="{4D53584B-980D-4F7D-BA36-682FCDF648BB}" type="datetimeFigureOut">
               <a:rPr lang="nl-BE" smtClean="0"/>
-              <a:t>8/05/2025</a:t>
+              <a:t>15/05/2025</a:t>
             </a:fld>
             <a:endParaRPr lang="nl-BE"/>
           </a:p>
@@ -4986,7 +4986,7 @@
           <a:p>
             <a:fld id="{F456E141-11F1-487F-A892-18B8A63336C7}" type="datetime1">
               <a:rPr lang="nl-BE" smtClean="0"/>
-              <a:t>8/05/2025</a:t>
+              <a:t>15/05/2025</a:t>
             </a:fld>
             <a:endParaRPr lang="nl-BE"/>
           </a:p>
@@ -5302,7 +5302,7 @@
           <a:p>
             <a:fld id="{85CAFD92-94F2-4CD0-8A1D-AA3295115CEC}" type="datetime1">
               <a:rPr lang="nl-BE" smtClean="0"/>
-              <a:t>8/05/2025</a:t>
+              <a:t>15/05/2025</a:t>
             </a:fld>
             <a:endParaRPr lang="nl-BE"/>
           </a:p>
@@ -5482,7 +5482,7 @@
           <a:p>
             <a:fld id="{02B84EFA-B363-4043-A12E-44B39EC7D05B}" type="datetime1">
               <a:rPr lang="nl-BE" smtClean="0"/>
-              <a:t>8/05/2025</a:t>
+              <a:t>15/05/2025</a:t>
             </a:fld>
             <a:endParaRPr lang="nl-BE"/>
           </a:p>
@@ -5681,7 +5681,7 @@
           <a:p>
             <a:fld id="{B7AA89A6-C9B9-4556-BC9E-5E3CF3322A33}" type="datetime1">
               <a:rPr lang="nl-BE" smtClean="0"/>
-              <a:t>8/05/2025</a:t>
+              <a:t>15/05/2025</a:t>
             </a:fld>
             <a:endParaRPr lang="nl-BE"/>
           </a:p>
@@ -5932,7 +5932,7 @@
           <a:p>
             <a:fld id="{6CEB42D4-4FBB-465F-AE58-8ADBDBF671C8}" type="datetime1">
               <a:rPr lang="nl-BE" smtClean="0"/>
-              <a:t>8/05/2025</a:t>
+              <a:t>15/05/2025</a:t>
             </a:fld>
             <a:endParaRPr lang="nl-BE"/>
           </a:p>
@@ -6164,7 +6164,7 @@
           <a:p>
             <a:fld id="{64B405D5-C0FD-42E0-9EB1-2670F471B7BB}" type="datetime1">
               <a:rPr lang="nl-BE" smtClean="0"/>
-              <a:t>8/05/2025</a:t>
+              <a:t>15/05/2025</a:t>
             </a:fld>
             <a:endParaRPr lang="nl-BE"/>
           </a:p>
@@ -6531,7 +6531,7 @@
           <a:p>
             <a:fld id="{4CB55C39-C031-448F-A58F-CA88F7B6F786}" type="datetime1">
               <a:rPr lang="nl-BE" smtClean="0"/>
-              <a:t>8/05/2025</a:t>
+              <a:t>15/05/2025</a:t>
             </a:fld>
             <a:endParaRPr lang="nl-BE"/>
           </a:p>
@@ -6649,7 +6649,7 @@
           <a:p>
             <a:fld id="{E29307F5-1DF0-4FFF-91A4-1E1A6A26A94A}" type="datetime1">
               <a:rPr lang="nl-BE" smtClean="0"/>
-              <a:t>8/05/2025</a:t>
+              <a:t>15/05/2025</a:t>
             </a:fld>
             <a:endParaRPr lang="nl-BE"/>
           </a:p>
@@ -6744,7 +6744,7 @@
           <a:p>
             <a:fld id="{00A9168B-A159-4E9D-A6C6-C6786C6AB2EB}" type="datetime1">
               <a:rPr lang="nl-BE" smtClean="0"/>
-              <a:t>8/05/2025</a:t>
+              <a:t>15/05/2025</a:t>
             </a:fld>
             <a:endParaRPr lang="nl-BE"/>
           </a:p>
@@ -7021,7 +7021,7 @@
           <a:p>
             <a:fld id="{E9D22159-AF82-4D23-BC06-D4277BDD9BAD}" type="datetime1">
               <a:rPr lang="nl-BE" smtClean="0"/>
-              <a:t>8/05/2025</a:t>
+              <a:t>15/05/2025</a:t>
             </a:fld>
             <a:endParaRPr lang="nl-BE"/>
           </a:p>
@@ -7274,7 +7274,7 @@
           <a:p>
             <a:fld id="{D08A7014-C292-4E4F-926C-1A31F538B52A}" type="datetime1">
               <a:rPr lang="nl-BE" smtClean="0"/>
-              <a:t>8/05/2025</a:t>
+              <a:t>15/05/2025</a:t>
             </a:fld>
             <a:endParaRPr lang="nl-BE"/>
           </a:p>
@@ -7487,7 +7487,7 @@
           <a:p>
             <a:fld id="{E9CC7161-F687-474C-905A-3CCBBA535086}" type="datetime1">
               <a:rPr lang="nl-BE" smtClean="0"/>
-              <a:t>8/05/2025</a:t>
+              <a:t>15/05/2025</a:t>
             </a:fld>
             <a:endParaRPr lang="nl-BE"/>
           </a:p>
@@ -8820,9 +8820,9 @@
               <a:rPr lang="en-US" dirty="0"/>
               <a:t>FN: It’s a cat but it’s exterminated</a:t>
             </a:r>
-          </a:p>
-          <a:p>
-            <a:pPr lvl="1"/>
+            <a:br>
+              <a:rPr lang="en-US" dirty="0"/>
+            </a:br>
             <a:r>
               <a:rPr lang="en-US" dirty="0"/>
               <a:t>(can’t be undone, should be avoided)</a:t>
@@ -9400,9 +9400,9 @@
               <a:rPr lang="en-US" dirty="0"/>
               <a:t>FN: It’s safe but it’s exterminated</a:t>
             </a:r>
-          </a:p>
-          <a:p>
-            <a:pPr lvl="1"/>
+            <a:br>
+              <a:rPr lang="en-US" dirty="0"/>
+            </a:br>
             <a:r>
               <a:rPr lang="en-US" dirty="0"/>
               <a:t>(a pity, but you live to see another day)</a:t>
@@ -11730,7 +11730,7 @@
         </p:blipFill>
         <p:spPr>
           <a:xfrm>
-            <a:off x="582705" y="3101526"/>
+            <a:off x="582705" y="3183822"/>
             <a:ext cx="7246382" cy="3437386"/>
           </a:xfrm>
           <a:prstGeom prst="rect">

</xml_diff>